<commit_message>
Final Presentation and Submission
This is the final presentation and submission for the project.

It has been updated with post-semester changes.
</commit_message>
<xml_diff>
--- a/Guardians of the GUI MD System Presentation.pptx
+++ b/Guardians of the GUI MD System Presentation.pptx
@@ -7130,15 +7130,7 @@
             <a:pPr lvl="1"/>
             <a:r>
               <a:rPr lang="en-US" dirty="0" smtClean="0"/>
-              <a:t>All of our database code </a:t>
-            </a:r>
-            <a:r>
-              <a:rPr lang="en-US" dirty="0" err="1" smtClean="0"/>
-              <a:t>isabstracted</a:t>
-            </a:r>
-            <a:r>
-              <a:rPr lang="en-US" dirty="0" smtClean="0"/>
-              <a:t> into the </a:t>
+              <a:t>All of our database code is abstracted into the </a:t>
             </a:r>
             <a:r>
               <a:rPr lang="en-US" dirty="0" err="1" smtClean="0"/>
@@ -7497,7 +7489,7 @@
             <p:ph sz="quarter" idx="1"/>
             <p:extLst>
               <p:ext uri="{D42A27DB-BD31-4B8C-83A1-F6EECF244321}">
-                <p14:modId xmlns:p14="http://schemas.microsoft.com/office/powerpoint/2010/main" val="859912952"/>
+                <p14:modId xmlns:p14="http://schemas.microsoft.com/office/powerpoint/2010/main" val="1603040230"/>
               </p:ext>
             </p:extLst>
           </p:nvPr>
@@ -7764,8 +7756,9 @@
                     <a:p>
                       <a:r>
                         <a:rPr lang="en-US" dirty="0" smtClean="0"/>
-                        <a:t>address 2</a:t>
+                        <a:t>address_2</a:t>
                       </a:r>
+                      <a:endParaRPr lang="en-US" dirty="0" smtClean="0"/>
                     </a:p>
                   </a:txBody>
                   <a:tcPr/>

</xml_diff>